<commit_message>
Phase 4B Organizational Chart (v1.01)
</commit_message>
<xml_diff>
--- a/Phase4B Org Chart.pptx
+++ b/Phase4B Org Chart.pptx
@@ -109,7 +109,7 @@
   </p:defaultTextStyle>
   <p:extLst>
     <p:ext uri="{EFAFB233-063F-42B5-8137-9DF3F51BA10A}">
-      <p15:sldGuideLst xmlns:p15="http://schemas.microsoft.com/office/powerpoint/2012/main" xmlns=""/>
+      <p15:sldGuideLst xmlns="" xmlns:p15="http://schemas.microsoft.com/office/powerpoint/2012/main"/>
     </p:ext>
   </p:extLst>
 </p:presentation>
@@ -5455,11 +5455,7 @@
             <a:pPr algn="ctr"/>
             <a:r>
               <a:rPr lang="en-US" sz="1200" dirty="0" smtClean="0"/>
-              <a:t>Ground </a:t>
-            </a:r>
-            <a:r>
-              <a:rPr lang="en-US" sz="1200" dirty="0" smtClean="0"/>
-              <a:t>Terminal and RF</a:t>
+              <a:t>Ground Terminal and RF</a:t>
             </a:r>
             <a:endParaRPr lang="en-US" sz="1200" dirty="0"/>
           </a:p>
@@ -5506,11 +5502,7 @@
             <a:pPr algn="ctr"/>
             <a:r>
               <a:rPr lang="en-US" dirty="0" smtClean="0"/>
-              <a:t>AMSAT </a:t>
-            </a:r>
-            <a:r>
-              <a:rPr lang="en-US" dirty="0" smtClean="0"/>
-              <a:t>Tech Volunteers</a:t>
+              <a:t>AMSAT Tech Volunteers</a:t>
             </a:r>
             <a:endParaRPr lang="en-US" dirty="0"/>
           </a:p>
@@ -5810,11 +5802,7 @@
             <a:pPr algn="ctr"/>
             <a:r>
               <a:rPr lang="en-US" dirty="0" smtClean="0"/>
-              <a:t>AMSAT </a:t>
-            </a:r>
-            <a:r>
-              <a:rPr lang="en-US" dirty="0" smtClean="0"/>
-              <a:t>Ops Volunteers</a:t>
+              <a:t>AMSAT Ops Volunteers</a:t>
             </a:r>
             <a:endParaRPr lang="en-US" dirty="0"/>
           </a:p>
@@ -5830,6 +5818,97 @@
           <a:xfrm>
             <a:off x="10300197" y="3201726"/>
             <a:ext cx="3260" cy="495730"/>
+          </a:xfrm>
+          <a:prstGeom prst="line">
+            <a:avLst/>
+          </a:prstGeom>
+          <a:ln w="25400">
+            <a:solidFill>
+              <a:schemeClr val="tx1"/>
+            </a:solidFill>
+          </a:ln>
+        </p:spPr>
+        <p:style>
+          <a:lnRef idx="1">
+            <a:schemeClr val="accent1"/>
+          </a:lnRef>
+          <a:fillRef idx="0">
+            <a:schemeClr val="accent1"/>
+          </a:fillRef>
+          <a:effectRef idx="0">
+            <a:schemeClr val="accent1"/>
+          </a:effectRef>
+          <a:fontRef idx="minor">
+            <a:schemeClr val="tx1"/>
+          </a:fontRef>
+        </p:style>
+      </p:cxnSp>
+      <p:sp>
+        <p:nvSpPr>
+          <p:cNvPr id="31" name="Rounded Rectangle 30"/>
+          <p:cNvSpPr/>
+          <p:nvPr/>
+        </p:nvSpPr>
+        <p:spPr>
+          <a:xfrm>
+            <a:off x="5620315" y="3675787"/>
+            <a:ext cx="1649690" cy="808082"/>
+          </a:xfrm>
+          <a:prstGeom prst="roundRect">
+            <a:avLst/>
+          </a:prstGeom>
+          <a:solidFill>
+            <a:srgbClr val="0F1EB1"/>
+          </a:solidFill>
+        </p:spPr>
+        <p:style>
+          <a:lnRef idx="2">
+            <a:schemeClr val="accent1">
+              <a:shade val="50000"/>
+            </a:schemeClr>
+          </a:lnRef>
+          <a:fillRef idx="1">
+            <a:schemeClr val="accent1"/>
+          </a:fillRef>
+          <a:effectRef idx="0">
+            <a:schemeClr val="accent1"/>
+          </a:effectRef>
+          <a:fontRef idx="minor">
+            <a:schemeClr val="lt1"/>
+          </a:fontRef>
+        </p:style>
+        <p:txBody>
+          <a:bodyPr rtlCol="0" anchor="ctr"/>
+          <a:lstStyle/>
+          <a:p>
+            <a:pPr algn="ctr"/>
+            <a:r>
+              <a:rPr lang="en-US" dirty="0" smtClean="0"/>
+              <a:t>Michelle Thompson</a:t>
+            </a:r>
+          </a:p>
+          <a:p>
+            <a:pPr algn="ctr"/>
+            <a:r>
+              <a:rPr lang="en-US" sz="1200" dirty="0" smtClean="0"/>
+              <a:t>Ground Terminal </a:t>
+            </a:r>
+            <a:endParaRPr lang="en-US" sz="1200" dirty="0"/>
+          </a:p>
+        </p:txBody>
+      </p:sp>
+      <p:cxnSp>
+        <p:nvCxnSpPr>
+          <p:cNvPr id="32" name="Straight Connector 31"/>
+          <p:cNvCxnSpPr>
+            <a:endCxn id="31" idx="0"/>
+          </p:cNvCxnSpPr>
+          <p:nvPr/>
+        </p:nvCxnSpPr>
+        <p:spPr>
+          <a:xfrm flipH="1">
+            <a:off x="6445160" y="3193050"/>
+            <a:ext cx="1368303" cy="482737"/>
           </a:xfrm>
           <a:prstGeom prst="line">
             <a:avLst/>
@@ -6130,7 +6209,7 @@
   <a:extraClrSchemeLst/>
   <a:extLst>
     <a:ext uri="{05A4C25C-085E-4340-85A3-A5531E510DB2}">
-      <thm15:themeFamily xmlns:thm15="http://schemas.microsoft.com/office/thememl/2012/main" xmlns="" name="Office Theme" id="{62F939B6-93AF-4DB8-9C6B-D6C7DFDC589F}" vid="{4A3C46E8-61CC-4603-A589-7422A47A8E4A}"/>
+      <thm15:themeFamily xmlns="" xmlns:thm15="http://schemas.microsoft.com/office/thememl/2012/main" name="Office Theme" id="{62F939B6-93AF-4DB8-9C6B-D6C7DFDC589F}" vid="{4A3C46E8-61CC-4603-A589-7422A47A8E4A}"/>
     </a:ext>
   </a:extLst>
 </a:theme>
@@ -6391,7 +6470,7 @@
   <a:extraClrSchemeLst/>
   <a:extLst>
     <a:ext uri="{05A4C25C-085E-4340-85A3-A5531E510DB2}">
-      <thm15:themeFamily xmlns:thm15="http://schemas.microsoft.com/office/thememl/2012/main" xmlns="" name="Office Theme" id="{62F939B6-93AF-4DB8-9C6B-D6C7DFDC589F}" vid="{4A3C46E8-61CC-4603-A589-7422A47A8E4A}"/>
+      <thm15:themeFamily xmlns="" xmlns:thm15="http://schemas.microsoft.com/office/thememl/2012/main" name="Office Theme" id="{62F939B6-93AF-4DB8-9C6B-D6C7DFDC589F}" vid="{4A3C46E8-61CC-4603-A589-7422A47A8E4A}"/>
     </a:ext>
   </a:extLst>
 </a:theme>

</xml_diff>